<commit_message>
Added issues for certain user form
</commit_message>
<xml_diff>
--- a/Прогресс выполнения работы.pptx
+++ b/Прогресс выполнения работы.pptx
@@ -3256,7 +3256,19 @@
             </a:pPr>
             <a:r>
               <a:rPr lang="ru-RU" sz="1700" dirty="0"/>
-              <a:t>Отображение активных задач и их статусов для конкретного участника проекта</a:t>
+              <a:t>Отображение активных задач и их статусов для конкретного участника </a:t>
+            </a:r>
+            <a:r>
+              <a:rPr lang="ru-RU" sz="1700" dirty="0" smtClean="0"/>
+              <a:t>проекта</a:t>
+            </a:r>
+            <a:r>
+              <a:rPr lang="en-US" sz="1700" dirty="0" smtClean="0"/>
+              <a:t> </a:t>
+            </a:r>
+            <a:r>
+              <a:rPr lang="en-US" sz="1700" b="1" dirty="0"/>
+              <a:t>+</a:t>
             </a:r>
             <a:endParaRPr lang="en-US" sz="1700" dirty="0"/>
           </a:p>
@@ -3589,8 +3601,21 @@
             </a:pPr>
             <a:r>
               <a:rPr lang="ru-RU" sz="1700" dirty="0"/>
-              <a:t>11. Отображение общего количества задач для конкретного участника проекта</a:t>
-            </a:r>
+              <a:t>11. Отображение общего количества задач для конкретного участника </a:t>
+            </a:r>
+            <a:r>
+              <a:rPr lang="ru-RU" sz="1700" dirty="0" smtClean="0"/>
+              <a:t>проекта</a:t>
+            </a:r>
+            <a:r>
+              <a:rPr lang="en-US" sz="1700" dirty="0" smtClean="0"/>
+              <a:t> </a:t>
+            </a:r>
+            <a:r>
+              <a:rPr lang="en-US" sz="1700" b="1" dirty="0"/>
+              <a:t>+</a:t>
+            </a:r>
+            <a:endParaRPr lang="ru-RU" sz="1700" dirty="0"/>
           </a:p>
           <a:p>
             <a:pPr lvl="0">
@@ -3601,6 +3626,10 @@
             <a:r>
               <a:rPr lang="ru-RU" sz="1700" dirty="0"/>
               <a:t>12. Просмотр задач для конкретного участника проекта </a:t>
+            </a:r>
+            <a:r>
+              <a:rPr lang="en-US" sz="1700" b="1" dirty="0"/>
+              <a:t>+</a:t>
             </a:r>
             <a:endParaRPr lang="en-US" sz="1700" dirty="0"/>
           </a:p>

</xml_diff>

<commit_message>
Added: filters for list of issues
</commit_message>
<xml_diff>
--- a/Прогресс выполнения работы.pptx
+++ b/Прогресс выполнения работы.pptx
@@ -1207,7 +1207,7 @@
               <a:pPr>
                 <a:defRPr/>
               </a:pPr>
-              <a:t>01.05.2017</a:t>
+              <a:t>01.06.2017</a:t>
             </a:fld>
             <a:endParaRPr lang="ru-RU" dirty="0"/>
           </a:p>
@@ -1546,7 +1546,7 @@
               <a:pPr>
                 <a:defRPr/>
               </a:pPr>
-              <a:t>01.05.2017</a:t>
+              <a:t>01.06.2017</a:t>
             </a:fld>
             <a:endParaRPr lang="ru-RU" dirty="0"/>
           </a:p>
@@ -1754,7 +1754,7 @@
               <a:pPr>
                 <a:defRPr/>
               </a:pPr>
-              <a:t>01.05.2017</a:t>
+              <a:t>01.06.2017</a:t>
             </a:fld>
             <a:endParaRPr lang="ru-RU" dirty="0"/>
           </a:p>
@@ -3216,7 +3216,7 @@
             </a:r>
             <a:r>
               <a:rPr lang="en-US" sz="1700" b="1" dirty="0" smtClean="0"/>
-              <a:t>+-</a:t>
+              <a:t>+</a:t>
             </a:r>
             <a:endParaRPr lang="en-US" sz="1700" b="1" dirty="0"/>
           </a:p>

</xml_diff>